<commit_message>
Assignment4 powerpoint updated on Pre_POC_V5
*STASTC - creating STC only on non rep
*Generator - starting plot of fit from -0.6 (it's smoothed earlier)
*RvsRest - Ploting only 1000 rate, and added support for figure pre
neuron
</commit_message>
<xml_diff>
--- a/4/Pre_POC_V5/Assignment4.pptx
+++ b/4/Pre_POC_V5/Assignment4.pptx
@@ -5,30 +5,24 @@
     <p:sldMasterId id="2147483660" r:id="rId2"/>
   </p:sldMasterIdLst>
   <p:notesMasterIdLst>
-    <p:notesMasterId r:id="rId21"/>
+    <p:notesMasterId r:id="rId15"/>
   </p:notesMasterIdLst>
   <p:handoutMasterIdLst>
-    <p:handoutMasterId r:id="rId22"/>
+    <p:handoutMasterId r:id="rId16"/>
   </p:handoutMasterIdLst>
   <p:sldIdLst>
     <p:sldId id="257" r:id="rId3"/>
     <p:sldId id="258" r:id="rId4"/>
     <p:sldId id="283" r:id="rId5"/>
     <p:sldId id="284" r:id="rId6"/>
-    <p:sldId id="285" r:id="rId7"/>
-    <p:sldId id="286" r:id="rId8"/>
-    <p:sldId id="287" r:id="rId9"/>
-    <p:sldId id="288" r:id="rId10"/>
-    <p:sldId id="289" r:id="rId11"/>
-    <p:sldId id="290" r:id="rId12"/>
-    <p:sldId id="291" r:id="rId13"/>
-    <p:sldId id="292" r:id="rId14"/>
-    <p:sldId id="293" r:id="rId15"/>
-    <p:sldId id="294" r:id="rId16"/>
-    <p:sldId id="295" r:id="rId17"/>
-    <p:sldId id="296" r:id="rId18"/>
-    <p:sldId id="297" r:id="rId19"/>
-    <p:sldId id="298" r:id="rId20"/>
+    <p:sldId id="299" r:id="rId7"/>
+    <p:sldId id="300" r:id="rId8"/>
+    <p:sldId id="302" r:id="rId9"/>
+    <p:sldId id="304" r:id="rId10"/>
+    <p:sldId id="293" r:id="rId11"/>
+    <p:sldId id="294" r:id="rId12"/>
+    <p:sldId id="306" r:id="rId13"/>
+    <p:sldId id="307" r:id="rId14"/>
   </p:sldIdLst>
   <p:sldSz cx="12188825" cy="6858000"/>
   <p:notesSz cx="6858000" cy="9144000"/>
@@ -292,7 +286,7 @@
           <a:p>
             <a:fld id="{BA5A207F-0F91-42F2-96D0-049C6003623B}" type="datetimeFigureOut">
               <a:rPr lang="en-US"/>
-              <a:t>2/16/2015</a:t>
+              <a:t>3/8/2015</a:t>
             </a:fld>
             <a:endParaRPr/>
           </a:p>
@@ -457,7 +451,7 @@
           <a:p>
             <a:fld id="{48CC13F5-F2B1-464B-BE8F-27ABFBD2FBDE}" type="datetimeFigureOut">
               <a:rPr lang="en-US"/>
-              <a:t>2/16/2015</a:t>
+              <a:t>3/8/2015</a:t>
             </a:fld>
             <a:endParaRPr/>
           </a:p>
@@ -882,7 +876,7 @@
     </p:spTree>
     <p:extLst>
       <p:ext uri="{BB962C8B-B14F-4D97-AF65-F5344CB8AC3E}">
-        <p14:creationId xmlns:p14="http://schemas.microsoft.com/office/powerpoint/2010/main" val="3058899950"/>
+        <p14:creationId xmlns:p14="http://schemas.microsoft.com/office/powerpoint/2010/main" val="3501409934"/>
       </p:ext>
     </p:extLst>
   </p:cSld>
@@ -966,511 +960,7 @@
     </p:spTree>
     <p:extLst>
       <p:ext uri="{BB962C8B-B14F-4D97-AF65-F5344CB8AC3E}">
-        <p14:creationId xmlns:p14="http://schemas.microsoft.com/office/powerpoint/2010/main" val="275729117"/>
-      </p:ext>
-    </p:extLst>
-  </p:cSld>
-  <p:clrMapOvr>
-    <a:masterClrMapping/>
-  </p:clrMapOvr>
-</p:notes>
-</file>
-
-<file path=ppt/notesSlides/notesSlide12.xml><?xml version="1.0" encoding="utf-8"?>
-<p:notes xmlns:a="http://schemas.openxmlformats.org/drawingml/2006/main" xmlns:r="http://schemas.openxmlformats.org/officeDocument/2006/relationships" xmlns:p="http://schemas.openxmlformats.org/presentationml/2006/main">
-  <p:cSld>
-    <p:spTree>
-      <p:nvGrpSpPr>
-        <p:cNvPr id="1" name=""/>
-        <p:cNvGrpSpPr/>
-        <p:nvPr/>
-      </p:nvGrpSpPr>
-      <p:grpSpPr>
-        <a:xfrm>
-          <a:off x="0" y="0"/>
-          <a:ext cx="0" cy="0"/>
-          <a:chOff x="0" y="0"/>
-          <a:chExt cx="0" cy="0"/>
-        </a:xfrm>
-      </p:grpSpPr>
-      <p:sp>
-        <p:nvSpPr>
-          <p:cNvPr id="2" name="Slide Image Placeholder 1"/>
-          <p:cNvSpPr>
-            <a:spLocks noGrp="1" noRot="1" noChangeAspect="1"/>
-          </p:cNvSpPr>
-          <p:nvPr>
-            <p:ph type="sldImg"/>
-          </p:nvPr>
-        </p:nvSpPr>
-        <p:spPr/>
-      </p:sp>
-      <p:sp>
-        <p:nvSpPr>
-          <p:cNvPr id="3" name="Notes Placeholder 2"/>
-          <p:cNvSpPr>
-            <a:spLocks noGrp="1"/>
-          </p:cNvSpPr>
-          <p:nvPr>
-            <p:ph type="body" idx="1"/>
-          </p:nvPr>
-        </p:nvSpPr>
-        <p:spPr/>
-        <p:txBody>
-          <a:bodyPr/>
-          <a:lstStyle/>
-          <a:p>
-            <a:endParaRPr lang="en-US" sz="1000" dirty="0"/>
-          </a:p>
-        </p:txBody>
-      </p:sp>
-      <p:sp>
-        <p:nvSpPr>
-          <p:cNvPr id="4" name="Slide Number Placeholder 3"/>
-          <p:cNvSpPr>
-            <a:spLocks noGrp="1"/>
-          </p:cNvSpPr>
-          <p:nvPr>
-            <p:ph type="sldNum" sz="quarter" idx="10"/>
-          </p:nvPr>
-        </p:nvSpPr>
-        <p:spPr/>
-        <p:txBody>
-          <a:bodyPr/>
-          <a:lstStyle/>
-          <a:p>
-            <a:fld id="{2E61351F-DBB1-4664-ADA9-83BC7CB8848D}" type="slidenum">
-              <a:rPr lang="en-US" smtClean="0"/>
-              <a:t>13</a:t>
-            </a:fld>
-            <a:endParaRPr lang="en-US"/>
-          </a:p>
-        </p:txBody>
-      </p:sp>
-    </p:spTree>
-    <p:extLst>
-      <p:ext uri="{BB962C8B-B14F-4D97-AF65-F5344CB8AC3E}">
-        <p14:creationId xmlns:p14="http://schemas.microsoft.com/office/powerpoint/2010/main" val="3900921018"/>
-      </p:ext>
-    </p:extLst>
-  </p:cSld>
-  <p:clrMapOvr>
-    <a:masterClrMapping/>
-  </p:clrMapOvr>
-</p:notes>
-</file>
-
-<file path=ppt/notesSlides/notesSlide13.xml><?xml version="1.0" encoding="utf-8"?>
-<p:notes xmlns:a="http://schemas.openxmlformats.org/drawingml/2006/main" xmlns:r="http://schemas.openxmlformats.org/officeDocument/2006/relationships" xmlns:p="http://schemas.openxmlformats.org/presentationml/2006/main">
-  <p:cSld>
-    <p:spTree>
-      <p:nvGrpSpPr>
-        <p:cNvPr id="1" name=""/>
-        <p:cNvGrpSpPr/>
-        <p:nvPr/>
-      </p:nvGrpSpPr>
-      <p:grpSpPr>
-        <a:xfrm>
-          <a:off x="0" y="0"/>
-          <a:ext cx="0" cy="0"/>
-          <a:chOff x="0" y="0"/>
-          <a:chExt cx="0" cy="0"/>
-        </a:xfrm>
-      </p:grpSpPr>
-      <p:sp>
-        <p:nvSpPr>
-          <p:cNvPr id="2" name="Slide Image Placeholder 1"/>
-          <p:cNvSpPr>
-            <a:spLocks noGrp="1" noRot="1" noChangeAspect="1"/>
-          </p:cNvSpPr>
-          <p:nvPr>
-            <p:ph type="sldImg"/>
-          </p:nvPr>
-        </p:nvSpPr>
-        <p:spPr/>
-      </p:sp>
-      <p:sp>
-        <p:nvSpPr>
-          <p:cNvPr id="3" name="Notes Placeholder 2"/>
-          <p:cNvSpPr>
-            <a:spLocks noGrp="1"/>
-          </p:cNvSpPr>
-          <p:nvPr>
-            <p:ph type="body" idx="1"/>
-          </p:nvPr>
-        </p:nvSpPr>
-        <p:spPr/>
-        <p:txBody>
-          <a:bodyPr/>
-          <a:lstStyle/>
-          <a:p>
-            <a:endParaRPr lang="en-US" sz="1000" dirty="0"/>
-          </a:p>
-        </p:txBody>
-      </p:sp>
-      <p:sp>
-        <p:nvSpPr>
-          <p:cNvPr id="4" name="Slide Number Placeholder 3"/>
-          <p:cNvSpPr>
-            <a:spLocks noGrp="1"/>
-          </p:cNvSpPr>
-          <p:nvPr>
-            <p:ph type="sldNum" sz="quarter" idx="10"/>
-          </p:nvPr>
-        </p:nvSpPr>
-        <p:spPr/>
-        <p:txBody>
-          <a:bodyPr/>
-          <a:lstStyle/>
-          <a:p>
-            <a:fld id="{2E61351F-DBB1-4664-ADA9-83BC7CB8848D}" type="slidenum">
-              <a:rPr lang="en-US" smtClean="0"/>
-              <a:t>14</a:t>
-            </a:fld>
-            <a:endParaRPr lang="en-US"/>
-          </a:p>
-        </p:txBody>
-      </p:sp>
-    </p:spTree>
-    <p:extLst>
-      <p:ext uri="{BB962C8B-B14F-4D97-AF65-F5344CB8AC3E}">
-        <p14:creationId xmlns:p14="http://schemas.microsoft.com/office/powerpoint/2010/main" val="3453886837"/>
-      </p:ext>
-    </p:extLst>
-  </p:cSld>
-  <p:clrMapOvr>
-    <a:masterClrMapping/>
-  </p:clrMapOvr>
-</p:notes>
-</file>
-
-<file path=ppt/notesSlides/notesSlide14.xml><?xml version="1.0" encoding="utf-8"?>
-<p:notes xmlns:a="http://schemas.openxmlformats.org/drawingml/2006/main" xmlns:r="http://schemas.openxmlformats.org/officeDocument/2006/relationships" xmlns:p="http://schemas.openxmlformats.org/presentationml/2006/main">
-  <p:cSld>
-    <p:spTree>
-      <p:nvGrpSpPr>
-        <p:cNvPr id="1" name=""/>
-        <p:cNvGrpSpPr/>
-        <p:nvPr/>
-      </p:nvGrpSpPr>
-      <p:grpSpPr>
-        <a:xfrm>
-          <a:off x="0" y="0"/>
-          <a:ext cx="0" cy="0"/>
-          <a:chOff x="0" y="0"/>
-          <a:chExt cx="0" cy="0"/>
-        </a:xfrm>
-      </p:grpSpPr>
-      <p:sp>
-        <p:nvSpPr>
-          <p:cNvPr id="2" name="Slide Image Placeholder 1"/>
-          <p:cNvSpPr>
-            <a:spLocks noGrp="1" noRot="1" noChangeAspect="1"/>
-          </p:cNvSpPr>
-          <p:nvPr>
-            <p:ph type="sldImg"/>
-          </p:nvPr>
-        </p:nvSpPr>
-        <p:spPr/>
-      </p:sp>
-      <p:sp>
-        <p:nvSpPr>
-          <p:cNvPr id="3" name="Notes Placeholder 2"/>
-          <p:cNvSpPr>
-            <a:spLocks noGrp="1"/>
-          </p:cNvSpPr>
-          <p:nvPr>
-            <p:ph type="body" idx="1"/>
-          </p:nvPr>
-        </p:nvSpPr>
-        <p:spPr/>
-        <p:txBody>
-          <a:bodyPr/>
-          <a:lstStyle/>
-          <a:p>
-            <a:endParaRPr lang="en-US" sz="1000" dirty="0"/>
-          </a:p>
-        </p:txBody>
-      </p:sp>
-      <p:sp>
-        <p:nvSpPr>
-          <p:cNvPr id="4" name="Slide Number Placeholder 3"/>
-          <p:cNvSpPr>
-            <a:spLocks noGrp="1"/>
-          </p:cNvSpPr>
-          <p:nvPr>
-            <p:ph type="sldNum" sz="quarter" idx="10"/>
-          </p:nvPr>
-        </p:nvSpPr>
-        <p:spPr/>
-        <p:txBody>
-          <a:bodyPr/>
-          <a:lstStyle/>
-          <a:p>
-            <a:fld id="{2E61351F-DBB1-4664-ADA9-83BC7CB8848D}" type="slidenum">
-              <a:rPr lang="en-US" smtClean="0"/>
-              <a:t>15</a:t>
-            </a:fld>
-            <a:endParaRPr lang="en-US"/>
-          </a:p>
-        </p:txBody>
-      </p:sp>
-    </p:spTree>
-    <p:extLst>
-      <p:ext uri="{BB962C8B-B14F-4D97-AF65-F5344CB8AC3E}">
-        <p14:creationId xmlns:p14="http://schemas.microsoft.com/office/powerpoint/2010/main" val="2231664407"/>
-      </p:ext>
-    </p:extLst>
-  </p:cSld>
-  <p:clrMapOvr>
-    <a:masterClrMapping/>
-  </p:clrMapOvr>
-</p:notes>
-</file>
-
-<file path=ppt/notesSlides/notesSlide15.xml><?xml version="1.0" encoding="utf-8"?>
-<p:notes xmlns:a="http://schemas.openxmlformats.org/drawingml/2006/main" xmlns:r="http://schemas.openxmlformats.org/officeDocument/2006/relationships" xmlns:p="http://schemas.openxmlformats.org/presentationml/2006/main">
-  <p:cSld>
-    <p:spTree>
-      <p:nvGrpSpPr>
-        <p:cNvPr id="1" name=""/>
-        <p:cNvGrpSpPr/>
-        <p:nvPr/>
-      </p:nvGrpSpPr>
-      <p:grpSpPr>
-        <a:xfrm>
-          <a:off x="0" y="0"/>
-          <a:ext cx="0" cy="0"/>
-          <a:chOff x="0" y="0"/>
-          <a:chExt cx="0" cy="0"/>
-        </a:xfrm>
-      </p:grpSpPr>
-      <p:sp>
-        <p:nvSpPr>
-          <p:cNvPr id="2" name="Slide Image Placeholder 1"/>
-          <p:cNvSpPr>
-            <a:spLocks noGrp="1" noRot="1" noChangeAspect="1"/>
-          </p:cNvSpPr>
-          <p:nvPr>
-            <p:ph type="sldImg"/>
-          </p:nvPr>
-        </p:nvSpPr>
-        <p:spPr/>
-      </p:sp>
-      <p:sp>
-        <p:nvSpPr>
-          <p:cNvPr id="3" name="Notes Placeholder 2"/>
-          <p:cNvSpPr>
-            <a:spLocks noGrp="1"/>
-          </p:cNvSpPr>
-          <p:nvPr>
-            <p:ph type="body" idx="1"/>
-          </p:nvPr>
-        </p:nvSpPr>
-        <p:spPr/>
-        <p:txBody>
-          <a:bodyPr/>
-          <a:lstStyle/>
-          <a:p>
-            <a:endParaRPr lang="en-US" sz="1000" dirty="0"/>
-          </a:p>
-        </p:txBody>
-      </p:sp>
-      <p:sp>
-        <p:nvSpPr>
-          <p:cNvPr id="4" name="Slide Number Placeholder 3"/>
-          <p:cNvSpPr>
-            <a:spLocks noGrp="1"/>
-          </p:cNvSpPr>
-          <p:nvPr>
-            <p:ph type="sldNum" sz="quarter" idx="10"/>
-          </p:nvPr>
-        </p:nvSpPr>
-        <p:spPr/>
-        <p:txBody>
-          <a:bodyPr/>
-          <a:lstStyle/>
-          <a:p>
-            <a:fld id="{2E61351F-DBB1-4664-ADA9-83BC7CB8848D}" type="slidenum">
-              <a:rPr lang="en-US" smtClean="0"/>
-              <a:t>16</a:t>
-            </a:fld>
-            <a:endParaRPr lang="en-US"/>
-          </a:p>
-        </p:txBody>
-      </p:sp>
-    </p:spTree>
-    <p:extLst>
-      <p:ext uri="{BB962C8B-B14F-4D97-AF65-F5344CB8AC3E}">
-        <p14:creationId xmlns:p14="http://schemas.microsoft.com/office/powerpoint/2010/main" val="4223772031"/>
-      </p:ext>
-    </p:extLst>
-  </p:cSld>
-  <p:clrMapOvr>
-    <a:masterClrMapping/>
-  </p:clrMapOvr>
-</p:notes>
-</file>
-
-<file path=ppt/notesSlides/notesSlide16.xml><?xml version="1.0" encoding="utf-8"?>
-<p:notes xmlns:a="http://schemas.openxmlformats.org/drawingml/2006/main" xmlns:r="http://schemas.openxmlformats.org/officeDocument/2006/relationships" xmlns:p="http://schemas.openxmlformats.org/presentationml/2006/main">
-  <p:cSld>
-    <p:spTree>
-      <p:nvGrpSpPr>
-        <p:cNvPr id="1" name=""/>
-        <p:cNvGrpSpPr/>
-        <p:nvPr/>
-      </p:nvGrpSpPr>
-      <p:grpSpPr>
-        <a:xfrm>
-          <a:off x="0" y="0"/>
-          <a:ext cx="0" cy="0"/>
-          <a:chOff x="0" y="0"/>
-          <a:chExt cx="0" cy="0"/>
-        </a:xfrm>
-      </p:grpSpPr>
-      <p:sp>
-        <p:nvSpPr>
-          <p:cNvPr id="2" name="Slide Image Placeholder 1"/>
-          <p:cNvSpPr>
-            <a:spLocks noGrp="1" noRot="1" noChangeAspect="1"/>
-          </p:cNvSpPr>
-          <p:nvPr>
-            <p:ph type="sldImg"/>
-          </p:nvPr>
-        </p:nvSpPr>
-        <p:spPr/>
-      </p:sp>
-      <p:sp>
-        <p:nvSpPr>
-          <p:cNvPr id="3" name="Notes Placeholder 2"/>
-          <p:cNvSpPr>
-            <a:spLocks noGrp="1"/>
-          </p:cNvSpPr>
-          <p:nvPr>
-            <p:ph type="body" idx="1"/>
-          </p:nvPr>
-        </p:nvSpPr>
-        <p:spPr/>
-        <p:txBody>
-          <a:bodyPr/>
-          <a:lstStyle/>
-          <a:p>
-            <a:endParaRPr lang="en-US" sz="1000" dirty="0"/>
-          </a:p>
-        </p:txBody>
-      </p:sp>
-      <p:sp>
-        <p:nvSpPr>
-          <p:cNvPr id="4" name="Slide Number Placeholder 3"/>
-          <p:cNvSpPr>
-            <a:spLocks noGrp="1"/>
-          </p:cNvSpPr>
-          <p:nvPr>
-            <p:ph type="sldNum" sz="quarter" idx="10"/>
-          </p:nvPr>
-        </p:nvSpPr>
-        <p:spPr/>
-        <p:txBody>
-          <a:bodyPr/>
-          <a:lstStyle/>
-          <a:p>
-            <a:fld id="{2E61351F-DBB1-4664-ADA9-83BC7CB8848D}" type="slidenum">
-              <a:rPr lang="en-US" smtClean="0"/>
-              <a:t>17</a:t>
-            </a:fld>
-            <a:endParaRPr lang="en-US"/>
-          </a:p>
-        </p:txBody>
-      </p:sp>
-    </p:spTree>
-    <p:extLst>
-      <p:ext uri="{BB962C8B-B14F-4D97-AF65-F5344CB8AC3E}">
-        <p14:creationId xmlns:p14="http://schemas.microsoft.com/office/powerpoint/2010/main" val="4152294147"/>
-      </p:ext>
-    </p:extLst>
-  </p:cSld>
-  <p:clrMapOvr>
-    <a:masterClrMapping/>
-  </p:clrMapOvr>
-</p:notes>
-</file>
-
-<file path=ppt/notesSlides/notesSlide17.xml><?xml version="1.0" encoding="utf-8"?>
-<p:notes xmlns:a="http://schemas.openxmlformats.org/drawingml/2006/main" xmlns:r="http://schemas.openxmlformats.org/officeDocument/2006/relationships" xmlns:p="http://schemas.openxmlformats.org/presentationml/2006/main">
-  <p:cSld>
-    <p:spTree>
-      <p:nvGrpSpPr>
-        <p:cNvPr id="1" name=""/>
-        <p:cNvGrpSpPr/>
-        <p:nvPr/>
-      </p:nvGrpSpPr>
-      <p:grpSpPr>
-        <a:xfrm>
-          <a:off x="0" y="0"/>
-          <a:ext cx="0" cy="0"/>
-          <a:chOff x="0" y="0"/>
-          <a:chExt cx="0" cy="0"/>
-        </a:xfrm>
-      </p:grpSpPr>
-      <p:sp>
-        <p:nvSpPr>
-          <p:cNvPr id="2" name="Slide Image Placeholder 1"/>
-          <p:cNvSpPr>
-            <a:spLocks noGrp="1" noRot="1" noChangeAspect="1"/>
-          </p:cNvSpPr>
-          <p:nvPr>
-            <p:ph type="sldImg"/>
-          </p:nvPr>
-        </p:nvSpPr>
-        <p:spPr/>
-      </p:sp>
-      <p:sp>
-        <p:nvSpPr>
-          <p:cNvPr id="3" name="Notes Placeholder 2"/>
-          <p:cNvSpPr>
-            <a:spLocks noGrp="1"/>
-          </p:cNvSpPr>
-          <p:nvPr>
-            <p:ph type="body" idx="1"/>
-          </p:nvPr>
-        </p:nvSpPr>
-        <p:spPr/>
-        <p:txBody>
-          <a:bodyPr/>
-          <a:lstStyle/>
-          <a:p>
-            <a:endParaRPr lang="en-US" sz="1000" dirty="0"/>
-          </a:p>
-        </p:txBody>
-      </p:sp>
-      <p:sp>
-        <p:nvSpPr>
-          <p:cNvPr id="4" name="Slide Number Placeholder 3"/>
-          <p:cNvSpPr>
-            <a:spLocks noGrp="1"/>
-          </p:cNvSpPr>
-          <p:nvPr>
-            <p:ph type="sldNum" sz="quarter" idx="10"/>
-          </p:nvPr>
-        </p:nvSpPr>
-        <p:spPr/>
-        <p:txBody>
-          <a:bodyPr/>
-          <a:lstStyle/>
-          <a:p>
-            <a:fld id="{2E61351F-DBB1-4664-ADA9-83BC7CB8848D}" type="slidenum">
-              <a:rPr lang="en-US" smtClean="0"/>
-              <a:t>18</a:t>
-            </a:fld>
-            <a:endParaRPr lang="en-US"/>
-          </a:p>
-        </p:txBody>
-      </p:sp>
-    </p:spTree>
-    <p:extLst>
-      <p:ext uri="{BB962C8B-B14F-4D97-AF65-F5344CB8AC3E}">
-        <p14:creationId xmlns:p14="http://schemas.microsoft.com/office/powerpoint/2010/main" val="1203914335"/>
+        <p14:creationId xmlns:p14="http://schemas.microsoft.com/office/powerpoint/2010/main" val="2227321640"/>
       </p:ext>
     </p:extLst>
   </p:cSld>
@@ -1722,7 +1212,7 @@
     </p:spTree>
     <p:extLst>
       <p:ext uri="{BB962C8B-B14F-4D97-AF65-F5344CB8AC3E}">
-        <p14:creationId xmlns:p14="http://schemas.microsoft.com/office/powerpoint/2010/main" val="4146915302"/>
+        <p14:creationId xmlns:p14="http://schemas.microsoft.com/office/powerpoint/2010/main" val="2622081055"/>
       </p:ext>
     </p:extLst>
   </p:cSld>
@@ -1806,7 +1296,7 @@
     </p:spTree>
     <p:extLst>
       <p:ext uri="{BB962C8B-B14F-4D97-AF65-F5344CB8AC3E}">
-        <p14:creationId xmlns:p14="http://schemas.microsoft.com/office/powerpoint/2010/main" val="3871242834"/>
+        <p14:creationId xmlns:p14="http://schemas.microsoft.com/office/powerpoint/2010/main" val="1094807622"/>
       </p:ext>
     </p:extLst>
   </p:cSld>
@@ -1890,7 +1380,7 @@
     </p:spTree>
     <p:extLst>
       <p:ext uri="{BB962C8B-B14F-4D97-AF65-F5344CB8AC3E}">
-        <p14:creationId xmlns:p14="http://schemas.microsoft.com/office/powerpoint/2010/main" val="2597128993"/>
+        <p14:creationId xmlns:p14="http://schemas.microsoft.com/office/powerpoint/2010/main" val="1941291476"/>
       </p:ext>
     </p:extLst>
   </p:cSld>
@@ -1974,7 +1464,7 @@
     </p:spTree>
     <p:extLst>
       <p:ext uri="{BB962C8B-B14F-4D97-AF65-F5344CB8AC3E}">
-        <p14:creationId xmlns:p14="http://schemas.microsoft.com/office/powerpoint/2010/main" val="1467007420"/>
+        <p14:creationId xmlns:p14="http://schemas.microsoft.com/office/powerpoint/2010/main" val="3311913212"/>
       </p:ext>
     </p:extLst>
   </p:cSld>
@@ -2058,7 +1548,7 @@
     </p:spTree>
     <p:extLst>
       <p:ext uri="{BB962C8B-B14F-4D97-AF65-F5344CB8AC3E}">
-        <p14:creationId xmlns:p14="http://schemas.microsoft.com/office/powerpoint/2010/main" val="3715437425"/>
+        <p14:creationId xmlns:p14="http://schemas.microsoft.com/office/powerpoint/2010/main" val="3900921018"/>
       </p:ext>
     </p:extLst>
   </p:cSld>
@@ -2142,7 +1632,7 @@
     </p:spTree>
     <p:extLst>
       <p:ext uri="{BB962C8B-B14F-4D97-AF65-F5344CB8AC3E}">
-        <p14:creationId xmlns:p14="http://schemas.microsoft.com/office/powerpoint/2010/main" val="2837690449"/>
+        <p14:creationId xmlns:p14="http://schemas.microsoft.com/office/powerpoint/2010/main" val="3453886837"/>
       </p:ext>
     </p:extLst>
   </p:cSld>
@@ -2200,7 +1690,7 @@
           <a:p>
             <a:fld id="{3CD9712D-992A-4AB1-A5C2-575F75921AA2}" type="datetimeFigureOut">
               <a:rPr lang="en-US" smtClean="0"/>
-              <a:t>2/16/2015</a:t>
+              <a:t>3/8/2015</a:t>
             </a:fld>
             <a:endParaRPr lang="en-US"/>
           </a:p>
@@ -2471,7 +1961,7 @@
           <a:p>
             <a:fld id="{3CD9712D-992A-4AB1-A5C2-575F75921AA2}" type="datetimeFigureOut">
               <a:rPr lang="en-US" smtClean="0"/>
-              <a:t>2/16/2015</a:t>
+              <a:t>3/8/2015</a:t>
             </a:fld>
             <a:endParaRPr lang="en-US"/>
           </a:p>
@@ -2676,7 +2166,7 @@
           <a:p>
             <a:fld id="{3CD9712D-992A-4AB1-A5C2-575F75921AA2}" type="datetimeFigureOut">
               <a:rPr lang="en-US" smtClean="0"/>
-              <a:t>2/16/2015</a:t>
+              <a:t>3/8/2015</a:t>
             </a:fld>
             <a:endParaRPr lang="en-US"/>
           </a:p>
@@ -2891,7 +2381,7 @@
           <a:p>
             <a:fld id="{3CD9712D-992A-4AB1-A5C2-575F75921AA2}" type="datetimeFigureOut">
               <a:rPr lang="en-US" smtClean="0"/>
-              <a:t>2/16/2015</a:t>
+              <a:t>3/8/2015</a:t>
             </a:fld>
             <a:endParaRPr lang="en-US"/>
           </a:p>
@@ -3096,7 +2586,7 @@
           <a:p>
             <a:fld id="{3CD9712D-992A-4AB1-A5C2-575F75921AA2}" type="datetimeFigureOut">
               <a:rPr lang="en-US" smtClean="0"/>
-              <a:t>2/16/2015</a:t>
+              <a:t>3/8/2015</a:t>
             </a:fld>
             <a:endParaRPr lang="en-US"/>
           </a:p>
@@ -3367,7 +2857,7 @@
           <a:p>
             <a:fld id="{3CD9712D-992A-4AB1-A5C2-575F75921AA2}" type="datetimeFigureOut">
               <a:rPr lang="en-US" smtClean="0"/>
-              <a:t>2/16/2015</a:t>
+              <a:t>3/8/2015</a:t>
             </a:fld>
             <a:endParaRPr lang="en-US"/>
           </a:p>
@@ -3678,7 +3168,7 @@
           <a:p>
             <a:fld id="{3CD9712D-992A-4AB1-A5C2-575F75921AA2}" type="datetimeFigureOut">
               <a:rPr lang="en-US" smtClean="0"/>
-              <a:t>2/16/2015</a:t>
+              <a:t>3/8/2015</a:t>
             </a:fld>
             <a:endParaRPr lang="en-US"/>
           </a:p>
@@ -4134,7 +3624,7 @@
           <a:p>
             <a:fld id="{3CD9712D-992A-4AB1-A5C2-575F75921AA2}" type="datetimeFigureOut">
               <a:rPr lang="en-US" smtClean="0"/>
-              <a:t>2/16/2015</a:t>
+              <a:t>3/8/2015</a:t>
             </a:fld>
             <a:endParaRPr lang="en-US"/>
           </a:p>
@@ -4271,7 +3761,7 @@
           <a:p>
             <a:fld id="{3CD9712D-992A-4AB1-A5C2-575F75921AA2}" type="datetimeFigureOut">
               <a:rPr lang="en-US" smtClean="0"/>
-              <a:t>2/16/2015</a:t>
+              <a:t>3/8/2015</a:t>
             </a:fld>
             <a:endParaRPr lang="en-US"/>
           </a:p>
@@ -4385,7 +3875,7 @@
           <a:p>
             <a:fld id="{3CD9712D-992A-4AB1-A5C2-575F75921AA2}" type="datetimeFigureOut">
               <a:rPr lang="en-US" smtClean="0"/>
-              <a:t>2/16/2015</a:t>
+              <a:t>3/8/2015</a:t>
             </a:fld>
             <a:endParaRPr lang="en-US"/>
           </a:p>
@@ -4937,7 +4427,7 @@
             <a:fld id="{3CD9712D-992A-4AB1-A5C2-575F75921AA2}" type="datetimeFigureOut">
               <a:rPr lang="en-US" smtClean="0"/>
               <a:pPr/>
-              <a:t>2/16/2015</a:t>
+              <a:t>3/8/2015</a:t>
             </a:fld>
             <a:endParaRPr lang="en-US"/>
           </a:p>
@@ -5596,562 +5086,6 @@
                 </a:effectLst>
                 <a:latin typeface="Baskerville Old Face" panose="02020602080505020303" pitchFamily="18" charset="0"/>
               </a:rPr>
-              <a:t>Q #3 – LN model – learning non rep - </a:t>
-            </a:r>
-            <a:r>
-              <a:rPr lang="en-US" b="1" dirty="0" err="1" smtClean="0">
-                <a:solidFill>
-                  <a:srgbClr val="E7D0A4"/>
-                </a:solidFill>
-                <a:effectLst>
-                  <a:outerShdw blurRad="38100" dist="38100" dir="2700000" algn="tl">
-                    <a:srgbClr val="000000">
-                      <a:alpha val="43137"/>
-                    </a:srgbClr>
-                  </a:outerShdw>
-                </a:effectLst>
-                <a:latin typeface="Baskerville Old Face" panose="02020602080505020303" pitchFamily="18" charset="0"/>
-              </a:rPr>
-              <a:t>RvsRest</a:t>
-            </a:r>
-            <a:endParaRPr lang="en-US" b="1" dirty="0">
-              <a:solidFill>
-                <a:srgbClr val="E7D0A4"/>
-              </a:solidFill>
-              <a:effectLst>
-                <a:outerShdw blurRad="38100" dist="38100" dir="2700000" algn="tl">
-                  <a:srgbClr val="000000">
-                    <a:alpha val="43137"/>
-                  </a:srgbClr>
-                </a:outerShdw>
-              </a:effectLst>
-              <a:latin typeface="Baskerville Old Face" panose="02020602080505020303" pitchFamily="18" charset="0"/>
-            </a:endParaRPr>
-          </a:p>
-        </p:txBody>
-      </p:sp>
-      <p:pic>
-        <p:nvPicPr>
-          <p:cNvPr id="4" name="תמונה 3"/>
-          <p:cNvPicPr>
-            <a:picLocks noChangeAspect="1"/>
-          </p:cNvPicPr>
-          <p:nvPr/>
-        </p:nvPicPr>
-        <p:blipFill>
-          <a:blip r:embed="rId3" cstate="print">
-            <a:extLst>
-              <a:ext uri="{28A0092B-C50C-407E-A947-70E740481C1C}">
-                <a14:useLocalDpi xmlns:a14="http://schemas.microsoft.com/office/drawing/2010/main" val="0"/>
-              </a:ext>
-            </a:extLst>
-          </a:blip>
-          <a:stretch>
-            <a:fillRect/>
-          </a:stretch>
-        </p:blipFill>
-        <p:spPr>
-          <a:xfrm>
-            <a:off x="333772" y="659111"/>
-            <a:ext cx="10918948" cy="6141908"/>
-          </a:xfrm>
-          <a:prstGeom prst="rect">
-            <a:avLst/>
-          </a:prstGeom>
-        </p:spPr>
-      </p:pic>
-    </p:spTree>
-    <p:extLst>
-      <p:ext uri="{BB962C8B-B14F-4D97-AF65-F5344CB8AC3E}">
-        <p14:creationId xmlns:p14="http://schemas.microsoft.com/office/powerpoint/2010/main" val="273854848"/>
-      </p:ext>
-    </p:extLst>
-  </p:cSld>
-  <p:clrMapOvr>
-    <a:masterClrMapping/>
-  </p:clrMapOvr>
-  <mc:AlternateContent xmlns:mc="http://schemas.openxmlformats.org/markup-compatibility/2006" xmlns:p14="http://schemas.microsoft.com/office/powerpoint/2010/main">
-    <mc:Choice Requires="p14">
-      <p:transition spd="med" p14:dur="700">
-        <p:fade/>
-      </p:transition>
-    </mc:Choice>
-    <mc:Fallback xmlns="">
-      <p:transition spd="med">
-        <p:fade/>
-      </p:transition>
-    </mc:Fallback>
-  </mc:AlternateContent>
-  <p:timing>
-    <p:tnLst>
-      <p:par>
-        <p:cTn id="1" dur="indefinite" restart="never" nodeType="tmRoot"/>
-      </p:par>
-    </p:tnLst>
-  </p:timing>
-</p:sld>
-</file>
-
-<file path=ppt/slides/slide11.xml><?xml version="1.0" encoding="utf-8"?>
-<p:sld xmlns:a="http://schemas.openxmlformats.org/drawingml/2006/main" xmlns:r="http://schemas.openxmlformats.org/officeDocument/2006/relationships" xmlns:p="http://schemas.openxmlformats.org/presentationml/2006/main">
-  <p:cSld>
-    <p:spTree>
-      <p:nvGrpSpPr>
-        <p:cNvPr id="1" name=""/>
-        <p:cNvGrpSpPr/>
-        <p:nvPr/>
-      </p:nvGrpSpPr>
-      <p:grpSpPr>
-        <a:xfrm>
-          <a:off x="0" y="0"/>
-          <a:ext cx="0" cy="0"/>
-          <a:chOff x="0" y="0"/>
-          <a:chExt cx="0" cy="0"/>
-        </a:xfrm>
-      </p:grpSpPr>
-      <p:sp>
-        <p:nvSpPr>
-          <p:cNvPr id="13" name="Title 12"/>
-          <p:cNvSpPr>
-            <a:spLocks noGrp="1"/>
-          </p:cNvSpPr>
-          <p:nvPr>
-            <p:ph type="title"/>
-          </p:nvPr>
-        </p:nvSpPr>
-        <p:spPr>
-          <a:xfrm>
-            <a:off x="1248053" y="0"/>
-            <a:ext cx="9601200" cy="666328"/>
-          </a:xfrm>
-        </p:spPr>
-        <p:txBody>
-          <a:bodyPr/>
-          <a:lstStyle/>
-          <a:p>
-            <a:r>
-              <a:rPr lang="en-US" b="1" dirty="0" smtClean="0">
-                <a:solidFill>
-                  <a:srgbClr val="E7D0A4"/>
-                </a:solidFill>
-                <a:effectLst>
-                  <a:outerShdw blurRad="38100" dist="38100" dir="2700000" algn="tl">
-                    <a:srgbClr val="000000">
-                      <a:alpha val="43137"/>
-                    </a:srgbClr>
-                  </a:outerShdw>
-                </a:effectLst>
-                <a:latin typeface="Baskerville Old Face" panose="02020602080505020303" pitchFamily="18" charset="0"/>
-              </a:rPr>
-              <a:t>Q #3 – LN model – testing rep - generator</a:t>
-            </a:r>
-            <a:endParaRPr lang="en-US" b="1" dirty="0">
-              <a:solidFill>
-                <a:srgbClr val="E7D0A4"/>
-              </a:solidFill>
-              <a:effectLst>
-                <a:outerShdw blurRad="38100" dist="38100" dir="2700000" algn="tl">
-                  <a:srgbClr val="000000">
-                    <a:alpha val="43137"/>
-                  </a:srgbClr>
-                </a:outerShdw>
-              </a:effectLst>
-              <a:latin typeface="Baskerville Old Face" panose="02020602080505020303" pitchFamily="18" charset="0"/>
-            </a:endParaRPr>
-          </a:p>
-        </p:txBody>
-      </p:sp>
-      <p:pic>
-        <p:nvPicPr>
-          <p:cNvPr id="4" name="תמונה 3"/>
-          <p:cNvPicPr>
-            <a:picLocks noChangeAspect="1"/>
-          </p:cNvPicPr>
-          <p:nvPr/>
-        </p:nvPicPr>
-        <p:blipFill>
-          <a:blip r:embed="rId3" cstate="print">
-            <a:extLst>
-              <a:ext uri="{28A0092B-C50C-407E-A947-70E740481C1C}">
-                <a14:useLocalDpi xmlns:a14="http://schemas.microsoft.com/office/drawing/2010/main" val="0"/>
-              </a:ext>
-            </a:extLst>
-          </a:blip>
-          <a:stretch>
-            <a:fillRect/>
-          </a:stretch>
-        </p:blipFill>
-        <p:spPr>
-          <a:xfrm>
-            <a:off x="981844" y="980728"/>
-            <a:ext cx="9694812" cy="5453332"/>
-          </a:xfrm>
-          <a:prstGeom prst="rect">
-            <a:avLst/>
-          </a:prstGeom>
-        </p:spPr>
-      </p:pic>
-    </p:spTree>
-    <p:extLst>
-      <p:ext uri="{BB962C8B-B14F-4D97-AF65-F5344CB8AC3E}">
-        <p14:creationId xmlns:p14="http://schemas.microsoft.com/office/powerpoint/2010/main" val="2351835198"/>
-      </p:ext>
-    </p:extLst>
-  </p:cSld>
-  <p:clrMapOvr>
-    <a:masterClrMapping/>
-  </p:clrMapOvr>
-  <mc:AlternateContent xmlns:mc="http://schemas.openxmlformats.org/markup-compatibility/2006" xmlns:p14="http://schemas.microsoft.com/office/powerpoint/2010/main">
-    <mc:Choice Requires="p14">
-      <p:transition spd="med" p14:dur="700">
-        <p:fade/>
-      </p:transition>
-    </mc:Choice>
-    <mc:Fallback xmlns="">
-      <p:transition spd="med">
-        <p:fade/>
-      </p:transition>
-    </mc:Fallback>
-  </mc:AlternateContent>
-  <p:timing>
-    <p:tnLst>
-      <p:par>
-        <p:cTn id="1" dur="indefinite" restart="never" nodeType="tmRoot"/>
-      </p:par>
-    </p:tnLst>
-  </p:timing>
-</p:sld>
-</file>
-
-<file path=ppt/slides/slide12.xml><?xml version="1.0" encoding="utf-8"?>
-<p:sld xmlns:a="http://schemas.openxmlformats.org/drawingml/2006/main" xmlns:r="http://schemas.openxmlformats.org/officeDocument/2006/relationships" xmlns:p="http://schemas.openxmlformats.org/presentationml/2006/main">
-  <p:cSld>
-    <p:spTree>
-      <p:nvGrpSpPr>
-        <p:cNvPr id="1" name=""/>
-        <p:cNvGrpSpPr/>
-        <p:nvPr/>
-      </p:nvGrpSpPr>
-      <p:grpSpPr>
-        <a:xfrm>
-          <a:off x="0" y="0"/>
-          <a:ext cx="0" cy="0"/>
-          <a:chOff x="0" y="0"/>
-          <a:chExt cx="0" cy="0"/>
-        </a:xfrm>
-      </p:grpSpPr>
-      <p:sp>
-        <p:nvSpPr>
-          <p:cNvPr id="13" name="Title 12"/>
-          <p:cNvSpPr>
-            <a:spLocks noGrp="1"/>
-          </p:cNvSpPr>
-          <p:nvPr>
-            <p:ph type="title"/>
-          </p:nvPr>
-        </p:nvSpPr>
-        <p:spPr>
-          <a:xfrm>
-            <a:off x="1248053" y="0"/>
-            <a:ext cx="9601200" cy="666328"/>
-          </a:xfrm>
-        </p:spPr>
-        <p:txBody>
-          <a:bodyPr/>
-          <a:lstStyle/>
-          <a:p>
-            <a:r>
-              <a:rPr lang="en-US" b="1" dirty="0" smtClean="0">
-                <a:solidFill>
-                  <a:srgbClr val="E7D0A4"/>
-                </a:solidFill>
-                <a:effectLst>
-                  <a:outerShdw blurRad="38100" dist="38100" dir="2700000" algn="tl">
-                    <a:srgbClr val="000000">
-                      <a:alpha val="43137"/>
-                    </a:srgbClr>
-                  </a:outerShdw>
-                </a:effectLst>
-                <a:latin typeface="Baskerville Old Face" panose="02020602080505020303" pitchFamily="18" charset="0"/>
-              </a:rPr>
-              <a:t>Q #3 – LN model – testing rep - </a:t>
-            </a:r>
-            <a:r>
-              <a:rPr lang="en-US" b="1" dirty="0" err="1" smtClean="0">
-                <a:solidFill>
-                  <a:srgbClr val="E7D0A4"/>
-                </a:solidFill>
-                <a:effectLst>
-                  <a:outerShdw blurRad="38100" dist="38100" dir="2700000" algn="tl">
-                    <a:srgbClr val="000000">
-                      <a:alpha val="43137"/>
-                    </a:srgbClr>
-                  </a:outerShdw>
-                </a:effectLst>
-                <a:latin typeface="Baskerville Old Face" panose="02020602080505020303" pitchFamily="18" charset="0"/>
-              </a:rPr>
-              <a:t>RvsRest</a:t>
-            </a:r>
-            <a:endParaRPr lang="en-US" b="1" dirty="0">
-              <a:solidFill>
-                <a:srgbClr val="E7D0A4"/>
-              </a:solidFill>
-              <a:effectLst>
-                <a:outerShdw blurRad="38100" dist="38100" dir="2700000" algn="tl">
-                  <a:srgbClr val="000000">
-                    <a:alpha val="43137"/>
-                  </a:srgbClr>
-                </a:outerShdw>
-              </a:effectLst>
-              <a:latin typeface="Baskerville Old Face" panose="02020602080505020303" pitchFamily="18" charset="0"/>
-            </a:endParaRPr>
-          </a:p>
-        </p:txBody>
-      </p:sp>
-      <p:pic>
-        <p:nvPicPr>
-          <p:cNvPr id="3" name="תמונה 2"/>
-          <p:cNvPicPr>
-            <a:picLocks noChangeAspect="1"/>
-          </p:cNvPicPr>
-          <p:nvPr/>
-        </p:nvPicPr>
-        <p:blipFill>
-          <a:blip r:embed="rId3" cstate="print">
-            <a:extLst>
-              <a:ext uri="{28A0092B-C50C-407E-A947-70E740481C1C}">
-                <a14:useLocalDpi xmlns:a14="http://schemas.microsoft.com/office/drawing/2010/main" val="0"/>
-              </a:ext>
-            </a:extLst>
-          </a:blip>
-          <a:stretch>
-            <a:fillRect/>
-          </a:stretch>
-        </p:blipFill>
-        <p:spPr>
-          <a:xfrm>
-            <a:off x="981844" y="1052736"/>
-            <a:ext cx="9622804" cy="5412827"/>
-          </a:xfrm>
-          <a:prstGeom prst="rect">
-            <a:avLst/>
-          </a:prstGeom>
-        </p:spPr>
-      </p:pic>
-    </p:spTree>
-    <p:extLst>
-      <p:ext uri="{BB962C8B-B14F-4D97-AF65-F5344CB8AC3E}">
-        <p14:creationId xmlns:p14="http://schemas.microsoft.com/office/powerpoint/2010/main" val="2276025158"/>
-      </p:ext>
-    </p:extLst>
-  </p:cSld>
-  <p:clrMapOvr>
-    <a:masterClrMapping/>
-  </p:clrMapOvr>
-  <mc:AlternateContent xmlns:mc="http://schemas.openxmlformats.org/markup-compatibility/2006" xmlns:p14="http://schemas.microsoft.com/office/powerpoint/2010/main">
-    <mc:Choice Requires="p14">
-      <p:transition spd="med" p14:dur="700">
-        <p:fade/>
-      </p:transition>
-    </mc:Choice>
-    <mc:Fallback xmlns="">
-      <p:transition spd="med">
-        <p:fade/>
-      </p:transition>
-    </mc:Fallback>
-  </mc:AlternateContent>
-  <p:timing>
-    <p:tnLst>
-      <p:par>
-        <p:cTn id="1" dur="indefinite" restart="never" nodeType="tmRoot"/>
-      </p:par>
-    </p:tnLst>
-  </p:timing>
-</p:sld>
-</file>
-
-<file path=ppt/slides/slide13.xml><?xml version="1.0" encoding="utf-8"?>
-<p:sld xmlns:a="http://schemas.openxmlformats.org/drawingml/2006/main" xmlns:r="http://schemas.openxmlformats.org/officeDocument/2006/relationships" xmlns:p="http://schemas.openxmlformats.org/presentationml/2006/main">
-  <p:cSld>
-    <p:spTree>
-      <p:nvGrpSpPr>
-        <p:cNvPr id="1" name=""/>
-        <p:cNvGrpSpPr/>
-        <p:nvPr/>
-      </p:nvGrpSpPr>
-      <p:grpSpPr>
-        <a:xfrm>
-          <a:off x="0" y="0"/>
-          <a:ext cx="0" cy="0"/>
-          <a:chOff x="0" y="0"/>
-          <a:chExt cx="0" cy="0"/>
-        </a:xfrm>
-      </p:grpSpPr>
-      <p:sp>
-        <p:nvSpPr>
-          <p:cNvPr id="13" name="Title 12"/>
-          <p:cNvSpPr>
-            <a:spLocks noGrp="1"/>
-          </p:cNvSpPr>
-          <p:nvPr>
-            <p:ph type="title"/>
-          </p:nvPr>
-        </p:nvSpPr>
-        <p:spPr>
-          <a:xfrm>
-            <a:off x="1248053" y="0"/>
-            <a:ext cx="9601200" cy="666328"/>
-          </a:xfrm>
-        </p:spPr>
-        <p:txBody>
-          <a:bodyPr/>
-          <a:lstStyle/>
-          <a:p>
-            <a:r>
-              <a:rPr lang="en-US" b="1" dirty="0" smtClean="0">
-                <a:solidFill>
-                  <a:srgbClr val="E7D0A4"/>
-                </a:solidFill>
-                <a:effectLst>
-                  <a:outerShdw blurRad="38100" dist="38100" dir="2700000" algn="tl">
-                    <a:srgbClr val="000000">
-                      <a:alpha val="43137"/>
-                    </a:srgbClr>
-                  </a:outerShdw>
-                </a:effectLst>
-                <a:latin typeface="Baskerville Old Face" panose="02020602080505020303" pitchFamily="18" charset="0"/>
-              </a:rPr>
-              <a:t>Q #4 – STC eigenvalues –non-rep</a:t>
-            </a:r>
-            <a:endParaRPr lang="en-US" b="1" dirty="0">
-              <a:solidFill>
-                <a:srgbClr val="E7D0A4"/>
-              </a:solidFill>
-              <a:effectLst>
-                <a:outerShdw blurRad="38100" dist="38100" dir="2700000" algn="tl">
-                  <a:srgbClr val="000000">
-                    <a:alpha val="43137"/>
-                  </a:srgbClr>
-                </a:outerShdw>
-              </a:effectLst>
-              <a:latin typeface="Baskerville Old Face" panose="02020602080505020303" pitchFamily="18" charset="0"/>
-            </a:endParaRPr>
-          </a:p>
-        </p:txBody>
-      </p:sp>
-      <p:pic>
-        <p:nvPicPr>
-          <p:cNvPr id="4" name="תמונה 3"/>
-          <p:cNvPicPr>
-            <a:picLocks noChangeAspect="1"/>
-          </p:cNvPicPr>
-          <p:nvPr/>
-        </p:nvPicPr>
-        <p:blipFill>
-          <a:blip r:embed="rId3">
-            <a:extLst>
-              <a:ext uri="{28A0092B-C50C-407E-A947-70E740481C1C}">
-                <a14:useLocalDpi xmlns:a14="http://schemas.microsoft.com/office/drawing/2010/main" val="0"/>
-              </a:ext>
-            </a:extLst>
-          </a:blip>
-          <a:stretch>
-            <a:fillRect/>
-          </a:stretch>
-        </p:blipFill>
-        <p:spPr>
-          <a:xfrm>
-            <a:off x="2061964" y="980728"/>
-            <a:ext cx="7314595" cy="5485946"/>
-          </a:xfrm>
-          <a:prstGeom prst="rect">
-            <a:avLst/>
-          </a:prstGeom>
-        </p:spPr>
-      </p:pic>
-    </p:spTree>
-    <p:extLst>
-      <p:ext uri="{BB962C8B-B14F-4D97-AF65-F5344CB8AC3E}">
-        <p14:creationId xmlns:p14="http://schemas.microsoft.com/office/powerpoint/2010/main" val="1931575417"/>
-      </p:ext>
-    </p:extLst>
-  </p:cSld>
-  <p:clrMapOvr>
-    <a:masterClrMapping/>
-  </p:clrMapOvr>
-  <mc:AlternateContent xmlns:mc="http://schemas.openxmlformats.org/markup-compatibility/2006" xmlns:p14="http://schemas.microsoft.com/office/powerpoint/2010/main">
-    <mc:Choice Requires="p14">
-      <p:transition spd="med" p14:dur="700">
-        <p:fade/>
-      </p:transition>
-    </mc:Choice>
-    <mc:Fallback xmlns="">
-      <p:transition spd="med">
-        <p:fade/>
-      </p:transition>
-    </mc:Fallback>
-  </mc:AlternateContent>
-  <p:timing>
-    <p:tnLst>
-      <p:par>
-        <p:cTn id="1" dur="indefinite" restart="never" nodeType="tmRoot"/>
-      </p:par>
-    </p:tnLst>
-  </p:timing>
-</p:sld>
-</file>
-
-<file path=ppt/slides/slide14.xml><?xml version="1.0" encoding="utf-8"?>
-<p:sld xmlns:a="http://schemas.openxmlformats.org/drawingml/2006/main" xmlns:r="http://schemas.openxmlformats.org/officeDocument/2006/relationships" xmlns:p="http://schemas.openxmlformats.org/presentationml/2006/main">
-  <p:cSld>
-    <p:spTree>
-      <p:nvGrpSpPr>
-        <p:cNvPr id="1" name=""/>
-        <p:cNvGrpSpPr/>
-        <p:nvPr/>
-      </p:nvGrpSpPr>
-      <p:grpSpPr>
-        <a:xfrm>
-          <a:off x="0" y="0"/>
-          <a:ext cx="0" cy="0"/>
-          <a:chOff x="0" y="0"/>
-          <a:chExt cx="0" cy="0"/>
-        </a:xfrm>
-      </p:grpSpPr>
-      <p:sp>
-        <p:nvSpPr>
-          <p:cNvPr id="13" name="Title 12"/>
-          <p:cNvSpPr>
-            <a:spLocks noGrp="1"/>
-          </p:cNvSpPr>
-          <p:nvPr>
-            <p:ph type="title"/>
-          </p:nvPr>
-        </p:nvSpPr>
-        <p:spPr>
-          <a:xfrm>
-            <a:off x="1248053" y="0"/>
-            <a:ext cx="9601200" cy="666328"/>
-          </a:xfrm>
-        </p:spPr>
-        <p:txBody>
-          <a:bodyPr/>
-          <a:lstStyle/>
-          <a:p>
-            <a:r>
-              <a:rPr lang="en-US" b="1" dirty="0" smtClean="0">
-                <a:solidFill>
-                  <a:srgbClr val="E7D0A4"/>
-                </a:solidFill>
-                <a:effectLst>
-                  <a:outerShdw blurRad="38100" dist="38100" dir="2700000" algn="tl">
-                    <a:srgbClr val="000000">
-                      <a:alpha val="43137"/>
-                    </a:srgbClr>
-                  </a:outerShdw>
-                </a:effectLst>
-                <a:latin typeface="Baskerville Old Face" panose="02020602080505020303" pitchFamily="18" charset="0"/>
-              </a:rPr>
               <a:t>Q #4 – STC filter non-rep</a:t>
             </a:r>
             <a:endParaRPr lang="en-US" b="1" dirty="0">
@@ -6232,7 +5166,7 @@
 </p:sld>
 </file>
 
-<file path=ppt/slides/slide15.xml><?xml version="1.0" encoding="utf-8"?>
+<file path=ppt/slides/slide11.xml><?xml version="1.0" encoding="utf-8"?>
 <p:sld xmlns:a="http://schemas.openxmlformats.org/drawingml/2006/main" xmlns:r="http://schemas.openxmlformats.org/officeDocument/2006/relationships" xmlns:p="http://schemas.openxmlformats.org/presentationml/2006/main">
   <p:cSld>
     <p:spTree>
@@ -6272,6 +5206,22 @@
           <a:lstStyle/>
           <a:p>
             <a:r>
+              <a:rPr lang="en-US" b="1" u="sng" dirty="0" smtClean="0">
+                <a:solidFill>
+                  <a:srgbClr val="E7D0A4"/>
+                </a:solidFill>
+                <a:effectLst>
+                  <a:outerShdw blurRad="38100" dist="38100" dir="2700000" algn="tl">
+                    <a:srgbClr val="000000">
+                      <a:alpha val="43137"/>
+                    </a:srgbClr>
+                  </a:outerShdw>
+                </a:effectLst>
+                <a:latin typeface="Baskerville Old Face" panose="02020602080505020303" pitchFamily="18" charset="0"/>
+              </a:rPr>
+              <a:t>Appendix:</a:t>
+            </a:r>
+            <a:r>
               <a:rPr lang="en-US" b="1" dirty="0" smtClean="0">
                 <a:solidFill>
                   <a:srgbClr val="E7D0A4"/>
@@ -6285,7 +5235,55 @@
                 </a:effectLst>
                 <a:latin typeface="Baskerville Old Face" panose="02020602080505020303" pitchFamily="18" charset="0"/>
               </a:rPr>
-              <a:t>Q #4 – LN model using STC – testing rep - generator</a:t>
+              <a:t> </a:t>
+            </a:r>
+            <a:r>
+              <a:rPr lang="en-US" b="1" dirty="0" smtClean="0">
+                <a:solidFill>
+                  <a:srgbClr val="E7D0A4"/>
+                </a:solidFill>
+                <a:effectLst>
+                  <a:outerShdw blurRad="38100" dist="38100" dir="2700000" algn="tl">
+                    <a:srgbClr val="000000">
+                      <a:alpha val="43137"/>
+                    </a:srgbClr>
+                  </a:outerShdw>
+                </a:effectLst>
+                <a:latin typeface="Baskerville Old Face" panose="02020602080505020303" pitchFamily="18" charset="0"/>
+              </a:rPr>
+              <a:t>Q </a:t>
+            </a:r>
+            <a:r>
+              <a:rPr lang="en-US" b="1" dirty="0" smtClean="0">
+                <a:solidFill>
+                  <a:srgbClr val="E7D0A4"/>
+                </a:solidFill>
+                <a:effectLst>
+                  <a:outerShdw blurRad="38100" dist="38100" dir="2700000" algn="tl">
+                    <a:srgbClr val="000000">
+                      <a:alpha val="43137"/>
+                    </a:srgbClr>
+                  </a:outerShdw>
+                </a:effectLst>
+                <a:latin typeface="Baskerville Old Face" panose="02020602080505020303" pitchFamily="18" charset="0"/>
+              </a:rPr>
+              <a:t>#3 – LN model – learning non rep - </a:t>
+            </a:r>
+            <a:r>
+              <a:rPr lang="en-US" b="1" dirty="0" err="1" smtClean="0">
+                <a:solidFill>
+                  <a:srgbClr val="E7D0A4"/>
+                </a:solidFill>
+                <a:effectLst>
+                  <a:outerShdw blurRad="38100" dist="38100" dir="2700000" algn="tl">
+                    <a:srgbClr val="000000">
+                      <a:alpha val="43137"/>
+                    </a:srgbClr>
+                  </a:outerShdw>
+                </a:effectLst>
+                <a:latin typeface="Baskerville Old Face" panose="02020602080505020303" pitchFamily="18" charset="0"/>
+              </a:rPr>
+              <a:t>RvsRest</a:t>
             </a:r>
             <a:endParaRPr lang="en-US" b="1" dirty="0">
               <a:solidFill>
@@ -6325,8 +5323,8 @@
         </p:blipFill>
         <p:spPr>
           <a:xfrm>
-            <a:off x="765820" y="836712"/>
-            <a:ext cx="10270876" cy="5777368"/>
+            <a:off x="360022" y="666328"/>
+            <a:ext cx="11377262" cy="6399710"/>
           </a:xfrm>
           <a:prstGeom prst="rect">
             <a:avLst/>
@@ -6336,7 +5334,7 @@
     </p:spTree>
     <p:extLst>
       <p:ext uri="{BB962C8B-B14F-4D97-AF65-F5344CB8AC3E}">
-        <p14:creationId xmlns:p14="http://schemas.microsoft.com/office/powerpoint/2010/main" val="2999921113"/>
+        <p14:creationId xmlns:p14="http://schemas.microsoft.com/office/powerpoint/2010/main" val="46124136"/>
       </p:ext>
     </p:extLst>
   </p:cSld>
@@ -6365,7 +5363,7 @@
 </p:sld>
 </file>
 
-<file path=ppt/slides/slide16.xml><?xml version="1.0" encoding="utf-8"?>
+<file path=ppt/slides/slide12.xml><?xml version="1.0" encoding="utf-8"?>
 <p:sld xmlns:a="http://schemas.openxmlformats.org/drawingml/2006/main" xmlns:r="http://schemas.openxmlformats.org/officeDocument/2006/relationships" xmlns:p="http://schemas.openxmlformats.org/presentationml/2006/main">
   <p:cSld>
     <p:spTree>
@@ -6405,6 +5403,38 @@
           <a:lstStyle/>
           <a:p>
             <a:r>
+              <a:rPr lang="en-US" b="1" u="sng" dirty="0">
+                <a:solidFill>
+                  <a:srgbClr val="E7D0A4"/>
+                </a:solidFill>
+                <a:effectLst>
+                  <a:outerShdw blurRad="38100" dist="38100" dir="2700000" algn="tl">
+                    <a:srgbClr val="000000">
+                      <a:alpha val="43137"/>
+                    </a:srgbClr>
+                  </a:outerShdw>
+                </a:effectLst>
+                <a:latin typeface="Baskerville Old Face" panose="02020602080505020303" pitchFamily="18" charset="0"/>
+              </a:rPr>
+              <a:t>Appendix:</a:t>
+            </a:r>
+            <a:r>
+              <a:rPr lang="en-US" b="1" dirty="0">
+                <a:solidFill>
+                  <a:srgbClr val="E7D0A4"/>
+                </a:solidFill>
+                <a:effectLst>
+                  <a:outerShdw blurRad="38100" dist="38100" dir="2700000" algn="tl">
+                    <a:srgbClr val="000000">
+                      <a:alpha val="43137"/>
+                    </a:srgbClr>
+                  </a:outerShdw>
+                </a:effectLst>
+                <a:latin typeface="Baskerville Old Face" panose="02020602080505020303" pitchFamily="18" charset="0"/>
+              </a:rPr>
+              <a:t> Q </a:t>
+            </a:r>
+            <a:r>
               <a:rPr lang="en-US" b="1" dirty="0" smtClean="0">
                 <a:solidFill>
                   <a:srgbClr val="E7D0A4"/>
@@ -6418,10 +5448,26 @@
                 </a:effectLst>
                 <a:latin typeface="Baskerville Old Face" panose="02020602080505020303" pitchFamily="18" charset="0"/>
               </a:rPr>
-              <a:t>Q #4 – LN model using STC – testing rep </a:t>
-            </a:r>
-            <a:r>
-              <a:rPr lang="en-US" b="1" dirty="0">
+              <a:t>#3 – LN model – </a:t>
+            </a:r>
+            <a:r>
+              <a:rPr lang="en-US" b="1" dirty="0" smtClean="0">
+                <a:solidFill>
+                  <a:srgbClr val="E7D0A4"/>
+                </a:solidFill>
+                <a:effectLst>
+                  <a:outerShdw blurRad="38100" dist="38100" dir="2700000" algn="tl">
+                    <a:srgbClr val="000000">
+                      <a:alpha val="43137"/>
+                    </a:srgbClr>
+                  </a:outerShdw>
+                </a:effectLst>
+                <a:latin typeface="Baskerville Old Face" panose="02020602080505020303" pitchFamily="18" charset="0"/>
+              </a:rPr>
+              <a:t>testing rep </a:t>
+            </a:r>
+            <a:r>
+              <a:rPr lang="en-US" b="1" dirty="0" smtClean="0">
                 <a:solidFill>
                   <a:srgbClr val="E7D0A4"/>
                 </a:solidFill>
@@ -6437,305 +5483,7 @@
               <a:t>- </a:t>
             </a:r>
             <a:r>
-              <a:rPr lang="en-US" b="1" dirty="0" err="1">
-                <a:solidFill>
-                  <a:srgbClr val="E7D0A4"/>
-                </a:solidFill>
-                <a:effectLst>
-                  <a:outerShdw blurRad="38100" dist="38100" dir="2700000" algn="tl">
-                    <a:srgbClr val="000000">
-                      <a:alpha val="43137"/>
-                    </a:srgbClr>
-                  </a:outerShdw>
-                </a:effectLst>
-                <a:latin typeface="Baskerville Old Face" panose="02020602080505020303" pitchFamily="18" charset="0"/>
-              </a:rPr>
-              <a:t>RvsRest</a:t>
-            </a:r>
-            <a:endParaRPr lang="en-US" b="1" dirty="0">
-              <a:solidFill>
-                <a:srgbClr val="E7D0A4"/>
-              </a:solidFill>
-              <a:effectLst>
-                <a:outerShdw blurRad="38100" dist="38100" dir="2700000" algn="tl">
-                  <a:srgbClr val="000000">
-                    <a:alpha val="43137"/>
-                  </a:srgbClr>
-                </a:outerShdw>
-              </a:effectLst>
-              <a:latin typeface="Baskerville Old Face" panose="02020602080505020303" pitchFamily="18" charset="0"/>
-            </a:endParaRPr>
-          </a:p>
-        </p:txBody>
-      </p:sp>
-      <p:pic>
-        <p:nvPicPr>
-          <p:cNvPr id="4" name="תמונה 3"/>
-          <p:cNvPicPr>
-            <a:picLocks noChangeAspect="1"/>
-          </p:cNvPicPr>
-          <p:nvPr/>
-        </p:nvPicPr>
-        <p:blipFill>
-          <a:blip r:embed="rId3" cstate="print">
-            <a:extLst>
-              <a:ext uri="{28A0092B-C50C-407E-A947-70E740481C1C}">
-                <a14:useLocalDpi xmlns:a14="http://schemas.microsoft.com/office/drawing/2010/main" val="0"/>
-              </a:ext>
-            </a:extLst>
-          </a:blip>
-          <a:stretch>
-            <a:fillRect/>
-          </a:stretch>
-        </p:blipFill>
-        <p:spPr>
-          <a:xfrm>
-            <a:off x="765820" y="836712"/>
-            <a:ext cx="10198868" cy="5736863"/>
-          </a:xfrm>
-          <a:prstGeom prst="rect">
-            <a:avLst/>
-          </a:prstGeom>
-        </p:spPr>
-      </p:pic>
-    </p:spTree>
-    <p:extLst>
-      <p:ext uri="{BB962C8B-B14F-4D97-AF65-F5344CB8AC3E}">
-        <p14:creationId xmlns:p14="http://schemas.microsoft.com/office/powerpoint/2010/main" val="4118126675"/>
-      </p:ext>
-    </p:extLst>
-  </p:cSld>
-  <p:clrMapOvr>
-    <a:masterClrMapping/>
-  </p:clrMapOvr>
-  <mc:AlternateContent xmlns:mc="http://schemas.openxmlformats.org/markup-compatibility/2006" xmlns:p14="http://schemas.microsoft.com/office/powerpoint/2010/main">
-    <mc:Choice Requires="p14">
-      <p:transition spd="med" p14:dur="700">
-        <p:fade/>
-      </p:transition>
-    </mc:Choice>
-    <mc:Fallback xmlns="">
-      <p:transition spd="med">
-        <p:fade/>
-      </p:transition>
-    </mc:Fallback>
-  </mc:AlternateContent>
-  <p:timing>
-    <p:tnLst>
-      <p:par>
-        <p:cTn id="1" dur="indefinite" restart="never" nodeType="tmRoot"/>
-      </p:par>
-    </p:tnLst>
-  </p:timing>
-</p:sld>
-</file>
-
-<file path=ppt/slides/slide17.xml><?xml version="1.0" encoding="utf-8"?>
-<p:sld xmlns:a="http://schemas.openxmlformats.org/drawingml/2006/main" xmlns:r="http://schemas.openxmlformats.org/officeDocument/2006/relationships" xmlns:p="http://schemas.openxmlformats.org/presentationml/2006/main">
-  <p:cSld>
-    <p:spTree>
-      <p:nvGrpSpPr>
-        <p:cNvPr id="1" name=""/>
-        <p:cNvGrpSpPr/>
-        <p:nvPr/>
-      </p:nvGrpSpPr>
-      <p:grpSpPr>
-        <a:xfrm>
-          <a:off x="0" y="0"/>
-          <a:ext cx="0" cy="0"/>
-          <a:chOff x="0" y="0"/>
-          <a:chExt cx="0" cy="0"/>
-        </a:xfrm>
-      </p:grpSpPr>
-      <p:sp>
-        <p:nvSpPr>
-          <p:cNvPr id="13" name="Title 12"/>
-          <p:cNvSpPr>
-            <a:spLocks noGrp="1"/>
-          </p:cNvSpPr>
-          <p:nvPr>
-            <p:ph type="title"/>
-          </p:nvPr>
-        </p:nvSpPr>
-        <p:spPr>
-          <a:xfrm>
-            <a:off x="1248053" y="0"/>
-            <a:ext cx="9601200" cy="666328"/>
-          </a:xfrm>
-        </p:spPr>
-        <p:txBody>
-          <a:bodyPr>
-            <a:normAutofit fontScale="90000"/>
-          </a:bodyPr>
-          <a:lstStyle/>
-          <a:p>
-            <a:r>
-              <a:rPr lang="en-US" b="1" dirty="0" smtClean="0">
-                <a:solidFill>
-                  <a:srgbClr val="E7D0A4"/>
-                </a:solidFill>
-                <a:effectLst>
-                  <a:outerShdw blurRad="38100" dist="38100" dir="2700000" algn="tl">
-                    <a:srgbClr val="000000">
-                      <a:alpha val="43137"/>
-                    </a:srgbClr>
-                  </a:outerShdw>
-                </a:effectLst>
-                <a:latin typeface="Baskerville Old Face" panose="02020602080505020303" pitchFamily="18" charset="0"/>
-              </a:rPr>
-              <a:t>Q #4 – LN model using STC – testing rep - generator</a:t>
-            </a:r>
-            <a:endParaRPr lang="en-US" b="1" dirty="0">
-              <a:solidFill>
-                <a:srgbClr val="E7D0A4"/>
-              </a:solidFill>
-              <a:effectLst>
-                <a:outerShdw blurRad="38100" dist="38100" dir="2700000" algn="tl">
-                  <a:srgbClr val="000000">
-                    <a:alpha val="43137"/>
-                  </a:srgbClr>
-                </a:outerShdw>
-              </a:effectLst>
-              <a:latin typeface="Baskerville Old Face" panose="02020602080505020303" pitchFamily="18" charset="0"/>
-            </a:endParaRPr>
-          </a:p>
-        </p:txBody>
-      </p:sp>
-      <p:pic>
-        <p:nvPicPr>
-          <p:cNvPr id="4" name="תמונה 3"/>
-          <p:cNvPicPr>
-            <a:picLocks noChangeAspect="1"/>
-          </p:cNvPicPr>
-          <p:nvPr/>
-        </p:nvPicPr>
-        <p:blipFill>
-          <a:blip r:embed="rId3" cstate="print">
-            <a:extLst>
-              <a:ext uri="{28A0092B-C50C-407E-A947-70E740481C1C}">
-                <a14:useLocalDpi xmlns:a14="http://schemas.microsoft.com/office/drawing/2010/main" val="0"/>
-              </a:ext>
-            </a:extLst>
-          </a:blip>
-          <a:stretch>
-            <a:fillRect/>
-          </a:stretch>
-        </p:blipFill>
-        <p:spPr>
-          <a:xfrm>
-            <a:off x="981844" y="836712"/>
-            <a:ext cx="10270876" cy="5777368"/>
-          </a:xfrm>
-          <a:prstGeom prst="rect">
-            <a:avLst/>
-          </a:prstGeom>
-        </p:spPr>
-      </p:pic>
-    </p:spTree>
-    <p:extLst>
-      <p:ext uri="{BB962C8B-B14F-4D97-AF65-F5344CB8AC3E}">
-        <p14:creationId xmlns:p14="http://schemas.microsoft.com/office/powerpoint/2010/main" val="3225860832"/>
-      </p:ext>
-    </p:extLst>
-  </p:cSld>
-  <p:clrMapOvr>
-    <a:masterClrMapping/>
-  </p:clrMapOvr>
-  <mc:AlternateContent xmlns:mc="http://schemas.openxmlformats.org/markup-compatibility/2006" xmlns:p14="http://schemas.microsoft.com/office/powerpoint/2010/main">
-    <mc:Choice Requires="p14">
-      <p:transition spd="med" p14:dur="700">
-        <p:fade/>
-      </p:transition>
-    </mc:Choice>
-    <mc:Fallback xmlns="">
-      <p:transition spd="med">
-        <p:fade/>
-      </p:transition>
-    </mc:Fallback>
-  </mc:AlternateContent>
-  <p:timing>
-    <p:tnLst>
-      <p:par>
-        <p:cTn id="1" dur="indefinite" restart="never" nodeType="tmRoot"/>
-      </p:par>
-    </p:tnLst>
-  </p:timing>
-</p:sld>
-</file>
-
-<file path=ppt/slides/slide18.xml><?xml version="1.0" encoding="utf-8"?>
-<p:sld xmlns:a="http://schemas.openxmlformats.org/drawingml/2006/main" xmlns:r="http://schemas.openxmlformats.org/officeDocument/2006/relationships" xmlns:p="http://schemas.openxmlformats.org/presentationml/2006/main">
-  <p:cSld>
-    <p:spTree>
-      <p:nvGrpSpPr>
-        <p:cNvPr id="1" name=""/>
-        <p:cNvGrpSpPr/>
-        <p:nvPr/>
-      </p:nvGrpSpPr>
-      <p:grpSpPr>
-        <a:xfrm>
-          <a:off x="0" y="0"/>
-          <a:ext cx="0" cy="0"/>
-          <a:chOff x="0" y="0"/>
-          <a:chExt cx="0" cy="0"/>
-        </a:xfrm>
-      </p:grpSpPr>
-      <p:sp>
-        <p:nvSpPr>
-          <p:cNvPr id="13" name="Title 12"/>
-          <p:cNvSpPr>
-            <a:spLocks noGrp="1"/>
-          </p:cNvSpPr>
-          <p:nvPr>
-            <p:ph type="title"/>
-          </p:nvPr>
-        </p:nvSpPr>
-        <p:spPr>
-          <a:xfrm>
-            <a:off x="1248053" y="0"/>
-            <a:ext cx="9601200" cy="666328"/>
-          </a:xfrm>
-        </p:spPr>
-        <p:txBody>
-          <a:bodyPr>
-            <a:normAutofit/>
-          </a:bodyPr>
-          <a:lstStyle/>
-          <a:p>
-            <a:r>
-              <a:rPr lang="en-US" b="1" dirty="0" smtClean="0">
-                <a:solidFill>
-                  <a:srgbClr val="E7D0A4"/>
-                </a:solidFill>
-                <a:effectLst>
-                  <a:outerShdw blurRad="38100" dist="38100" dir="2700000" algn="tl">
-                    <a:srgbClr val="000000">
-                      <a:alpha val="43137"/>
-                    </a:srgbClr>
-                  </a:outerShdw>
-                </a:effectLst>
-                <a:latin typeface="Baskerville Old Face" panose="02020602080505020303" pitchFamily="18" charset="0"/>
-              </a:rPr>
-              <a:t>Q #4 – LN model using STC – testing rep </a:t>
-            </a:r>
-            <a:r>
-              <a:rPr lang="en-US" b="1" dirty="0">
-                <a:solidFill>
-                  <a:srgbClr val="E7D0A4"/>
-                </a:solidFill>
-                <a:effectLst>
-                  <a:outerShdw blurRad="38100" dist="38100" dir="2700000" algn="tl">
-                    <a:srgbClr val="000000">
-                      <a:alpha val="43137"/>
-                    </a:srgbClr>
-                  </a:outerShdw>
-                </a:effectLst>
-                <a:latin typeface="Baskerville Old Face" panose="02020602080505020303" pitchFamily="18" charset="0"/>
-              </a:rPr>
-              <a:t>- </a:t>
-            </a:r>
-            <a:r>
-              <a:rPr lang="en-US" b="1" dirty="0" err="1">
+              <a:rPr lang="en-US" b="1" dirty="0" err="1" smtClean="0">
                 <a:solidFill>
                   <a:srgbClr val="E7D0A4"/>
                 </a:solidFill>
@@ -6788,8 +5536,8 @@
         </p:blipFill>
         <p:spPr>
           <a:xfrm>
-            <a:off x="549796" y="620307"/>
-            <a:ext cx="11089232" cy="6237693"/>
+            <a:off x="360022" y="666328"/>
+            <a:ext cx="11377262" cy="6399709"/>
           </a:xfrm>
           <a:prstGeom prst="rect">
             <a:avLst/>
@@ -6799,7 +5547,7 @@
     </p:spTree>
     <p:extLst>
       <p:ext uri="{BB962C8B-B14F-4D97-AF65-F5344CB8AC3E}">
-        <p14:creationId xmlns:p14="http://schemas.microsoft.com/office/powerpoint/2010/main" val="1680818282"/>
+        <p14:creationId xmlns:p14="http://schemas.microsoft.com/office/powerpoint/2010/main" val="3208721674"/>
       </p:ext>
     </p:extLst>
   </p:cSld>
@@ -7141,7 +5889,23 @@
                 </a:effectLst>
                 <a:latin typeface="Baskerville Old Face" panose="02020602080505020303" pitchFamily="18" charset="0"/>
               </a:rPr>
-              <a:t>Q #2 – STA-rep</a:t>
+              <a:t>Q #2 – </a:t>
+            </a:r>
+            <a:r>
+              <a:rPr lang="en-US" b="1" dirty="0" smtClean="0">
+                <a:solidFill>
+                  <a:srgbClr val="E7D0A4"/>
+                </a:solidFill>
+                <a:effectLst>
+                  <a:outerShdw blurRad="38100" dist="38100" dir="2700000" algn="tl">
+                    <a:srgbClr val="000000">
+                      <a:alpha val="43137"/>
+                    </a:srgbClr>
+                  </a:outerShdw>
+                </a:effectLst>
+                <a:latin typeface="Baskerville Old Face" panose="02020602080505020303" pitchFamily="18" charset="0"/>
+              </a:rPr>
+              <a:t>STA-non-rep</a:t>
             </a:r>
             <a:endParaRPr lang="en-US" b="1" dirty="0">
               <a:solidFill>
@@ -7272,7 +6036,7 @@
                 </a:effectLst>
                 <a:latin typeface="Baskerville Old Face" panose="02020602080505020303" pitchFamily="18" charset="0"/>
               </a:rPr>
-              <a:t>Q #3 – LN model – learning non rep - generator</a:t>
+              <a:t>Q #2 – STA-rep</a:t>
             </a:r>
             <a:endParaRPr lang="en-US" b="1" dirty="0">
               <a:solidFill>
@@ -7292,14 +6056,14 @@
       </p:sp>
       <p:pic>
         <p:nvPicPr>
-          <p:cNvPr id="4" name="תמונה 3"/>
+          <p:cNvPr id="3" name="תמונה 2"/>
           <p:cNvPicPr>
             <a:picLocks noChangeAspect="1"/>
           </p:cNvPicPr>
           <p:nvPr/>
         </p:nvPicPr>
         <p:blipFill>
-          <a:blip r:embed="rId3" cstate="print">
+          <a:blip r:embed="rId3">
             <a:extLst>
               <a:ext uri="{28A0092B-C50C-407E-A947-70E740481C1C}">
                 <a14:useLocalDpi xmlns:a14="http://schemas.microsoft.com/office/drawing/2010/main" val="0"/>
@@ -7312,8 +6076,8 @@
         </p:blipFill>
         <p:spPr>
           <a:xfrm>
-            <a:off x="1053852" y="801982"/>
-            <a:ext cx="9406780" cy="5291314"/>
+            <a:off x="2391355" y="908720"/>
+            <a:ext cx="7314595" cy="5485946"/>
           </a:xfrm>
           <a:prstGeom prst="rect">
             <a:avLst/>
@@ -7323,20 +6087,20 @@
     </p:spTree>
     <p:extLst>
       <p:ext uri="{BB962C8B-B14F-4D97-AF65-F5344CB8AC3E}">
-        <p14:creationId xmlns:p14="http://schemas.microsoft.com/office/powerpoint/2010/main" val="2694766288"/>
+        <p14:creationId xmlns:p14="http://schemas.microsoft.com/office/powerpoint/2010/main" val="566133980"/>
       </p:ext>
     </p:extLst>
   </p:cSld>
   <p:clrMapOvr>
     <a:masterClrMapping/>
   </p:clrMapOvr>
-  <mc:AlternateContent xmlns:mc="http://schemas.openxmlformats.org/markup-compatibility/2006" xmlns:p14="http://schemas.microsoft.com/office/powerpoint/2010/main">
-    <mc:Choice Requires="p14">
+  <mc:AlternateContent xmlns:mc="http://schemas.openxmlformats.org/markup-compatibility/2006">
+    <mc:Choice xmlns:p14="http://schemas.microsoft.com/office/powerpoint/2010/main" Requires="p14">
       <p:transition spd="med" p14:dur="700">
         <p:fade/>
       </p:transition>
     </mc:Choice>
-    <mc:Fallback xmlns="">
+    <mc:Fallback>
       <p:transition spd="med">
         <p:fade/>
       </p:transition>
@@ -7403,23 +6167,7 @@
                 </a:effectLst>
                 <a:latin typeface="Baskerville Old Face" panose="02020602080505020303" pitchFamily="18" charset="0"/>
               </a:rPr>
-              <a:t>Q #3 – LN model – learning non rep - </a:t>
-            </a:r>
-            <a:r>
-              <a:rPr lang="en-US" b="1" dirty="0" err="1" smtClean="0">
-                <a:solidFill>
-                  <a:srgbClr val="E7D0A4"/>
-                </a:solidFill>
-                <a:effectLst>
-                  <a:outerShdw blurRad="38100" dist="38100" dir="2700000" algn="tl">
-                    <a:srgbClr val="000000">
-                      <a:alpha val="43137"/>
-                    </a:srgbClr>
-                  </a:outerShdw>
-                </a:effectLst>
-                <a:latin typeface="Baskerville Old Face" panose="02020602080505020303" pitchFamily="18" charset="0"/>
-              </a:rPr>
-              <a:t>RvsRest</a:t>
+              <a:t>Q #3 – LN model – learning non rep - generator</a:t>
             </a:r>
             <a:endParaRPr lang="en-US" b="1" dirty="0">
               <a:solidFill>
@@ -7439,7 +6187,7 @@
       </p:sp>
       <p:pic>
         <p:nvPicPr>
-          <p:cNvPr id="2" name="תמונה 1"/>
+          <p:cNvPr id="4" name="תמונה 3"/>
           <p:cNvPicPr>
             <a:picLocks noChangeAspect="1"/>
           </p:cNvPicPr>
@@ -7459,8 +6207,8 @@
         </p:blipFill>
         <p:spPr>
           <a:xfrm>
-            <a:off x="1381267" y="980728"/>
-            <a:ext cx="9334772" cy="5250809"/>
+            <a:off x="1053853" y="801982"/>
+            <a:ext cx="9406778" cy="5291313"/>
           </a:xfrm>
           <a:prstGeom prst="rect">
             <a:avLst/>
@@ -7470,20 +6218,20 @@
     </p:spTree>
     <p:extLst>
       <p:ext uri="{BB962C8B-B14F-4D97-AF65-F5344CB8AC3E}">
-        <p14:creationId xmlns:p14="http://schemas.microsoft.com/office/powerpoint/2010/main" val="2935626163"/>
+        <p14:creationId xmlns:p14="http://schemas.microsoft.com/office/powerpoint/2010/main" val="3015067917"/>
       </p:ext>
     </p:extLst>
   </p:cSld>
   <p:clrMapOvr>
     <a:masterClrMapping/>
   </p:clrMapOvr>
-  <mc:AlternateContent xmlns:mc="http://schemas.openxmlformats.org/markup-compatibility/2006" xmlns:p14="http://schemas.microsoft.com/office/powerpoint/2010/main">
-    <mc:Choice Requires="p14">
+  <mc:AlternateContent xmlns:mc="http://schemas.openxmlformats.org/markup-compatibility/2006">
+    <mc:Choice xmlns:p14="http://schemas.microsoft.com/office/powerpoint/2010/main" Requires="p14">
       <p:transition spd="med" p14:dur="700">
         <p:fade/>
       </p:transition>
     </mc:Choice>
-    <mc:Fallback xmlns="">
+    <mc:Fallback>
       <p:transition spd="med">
         <p:fade/>
       </p:transition>
@@ -7550,7 +6298,23 @@
                 </a:effectLst>
                 <a:latin typeface="Baskerville Old Face" panose="02020602080505020303" pitchFamily="18" charset="0"/>
               </a:rPr>
-              <a:t>Q #3 – LN model – testing rep - generator</a:t>
+              <a:t>Q #3 – LN model – learning non rep - </a:t>
+            </a:r>
+            <a:r>
+              <a:rPr lang="en-US" b="1" dirty="0" err="1" smtClean="0">
+                <a:solidFill>
+                  <a:srgbClr val="E7D0A4"/>
+                </a:solidFill>
+                <a:effectLst>
+                  <a:outerShdw blurRad="38100" dist="38100" dir="2700000" algn="tl">
+                    <a:srgbClr val="000000">
+                      <a:alpha val="43137"/>
+                    </a:srgbClr>
+                  </a:outerShdw>
+                </a:effectLst>
+                <a:latin typeface="Baskerville Old Face" panose="02020602080505020303" pitchFamily="18" charset="0"/>
+              </a:rPr>
+              <a:t>RvsRest</a:t>
             </a:r>
             <a:endParaRPr lang="en-US" b="1" dirty="0">
               <a:solidFill>
@@ -7570,7 +6334,7 @@
       </p:sp>
       <p:pic>
         <p:nvPicPr>
-          <p:cNvPr id="3" name="תמונה 2"/>
+          <p:cNvPr id="2" name="תמונה 1"/>
           <p:cNvPicPr>
             <a:picLocks noChangeAspect="1"/>
           </p:cNvPicPr>
@@ -7590,8 +6354,8 @@
         </p:blipFill>
         <p:spPr>
           <a:xfrm>
-            <a:off x="1485900" y="1124744"/>
-            <a:ext cx="8542684" cy="4805260"/>
+            <a:off x="360021" y="666328"/>
+            <a:ext cx="11377264" cy="6399710"/>
           </a:xfrm>
           <a:prstGeom prst="rect">
             <a:avLst/>
@@ -7601,20 +6365,20 @@
     </p:spTree>
     <p:extLst>
       <p:ext uri="{BB962C8B-B14F-4D97-AF65-F5344CB8AC3E}">
-        <p14:creationId xmlns:p14="http://schemas.microsoft.com/office/powerpoint/2010/main" val="4141913112"/>
+        <p14:creationId xmlns:p14="http://schemas.microsoft.com/office/powerpoint/2010/main" val="2901264810"/>
       </p:ext>
     </p:extLst>
   </p:cSld>
   <p:clrMapOvr>
     <a:masterClrMapping/>
   </p:clrMapOvr>
-  <mc:AlternateContent xmlns:mc="http://schemas.openxmlformats.org/markup-compatibility/2006" xmlns:p14="http://schemas.microsoft.com/office/powerpoint/2010/main">
-    <mc:Choice Requires="p14">
+  <mc:AlternateContent xmlns:mc="http://schemas.openxmlformats.org/markup-compatibility/2006">
+    <mc:Choice xmlns:p14="http://schemas.microsoft.com/office/powerpoint/2010/main" Requires="p14">
       <p:transition spd="med" p14:dur="700">
         <p:fade/>
       </p:transition>
     </mc:Choice>
-    <mc:Fallback xmlns="">
+    <mc:Fallback>
       <p:transition spd="med">
         <p:fade/>
       </p:transition>
@@ -7681,7 +6445,39 @@
                 </a:effectLst>
                 <a:latin typeface="Baskerville Old Face" panose="02020602080505020303" pitchFamily="18" charset="0"/>
               </a:rPr>
-              <a:t>Q #3 – LN model – testing rep - </a:t>
+              <a:t>Q #3 – LN model – </a:t>
+            </a:r>
+            <a:r>
+              <a:rPr lang="en-US" b="1" dirty="0" smtClean="0">
+                <a:solidFill>
+                  <a:srgbClr val="E7D0A4"/>
+                </a:solidFill>
+                <a:effectLst>
+                  <a:outerShdw blurRad="38100" dist="38100" dir="2700000" algn="tl">
+                    <a:srgbClr val="000000">
+                      <a:alpha val="43137"/>
+                    </a:srgbClr>
+                  </a:outerShdw>
+                </a:effectLst>
+                <a:latin typeface="Baskerville Old Face" panose="02020602080505020303" pitchFamily="18" charset="0"/>
+              </a:rPr>
+              <a:t>testing rep </a:t>
+            </a:r>
+            <a:r>
+              <a:rPr lang="en-US" b="1" dirty="0" smtClean="0">
+                <a:solidFill>
+                  <a:srgbClr val="E7D0A4"/>
+                </a:solidFill>
+                <a:effectLst>
+                  <a:outerShdw blurRad="38100" dist="38100" dir="2700000" algn="tl">
+                    <a:srgbClr val="000000">
+                      <a:alpha val="43137"/>
+                    </a:srgbClr>
+                  </a:outerShdw>
+                </a:effectLst>
+                <a:latin typeface="Baskerville Old Face" panose="02020602080505020303" pitchFamily="18" charset="0"/>
+              </a:rPr>
+              <a:t>- </a:t>
             </a:r>
             <a:r>
               <a:rPr lang="en-US" b="1" dirty="0" err="1" smtClean="0">
@@ -7717,7 +6513,7 @@
       </p:sp>
       <p:pic>
         <p:nvPicPr>
-          <p:cNvPr id="4" name="תמונה 3"/>
+          <p:cNvPr id="2" name="תמונה 1"/>
           <p:cNvPicPr>
             <a:picLocks noChangeAspect="1"/>
           </p:cNvPicPr>
@@ -7737,8 +6533,8 @@
         </p:blipFill>
         <p:spPr>
           <a:xfrm>
-            <a:off x="1125860" y="980728"/>
-            <a:ext cx="9334772" cy="5250809"/>
+            <a:off x="360022" y="666328"/>
+            <a:ext cx="11377262" cy="6399710"/>
           </a:xfrm>
           <a:prstGeom prst="rect">
             <a:avLst/>
@@ -7748,20 +6544,20 @@
     </p:spTree>
     <p:extLst>
       <p:ext uri="{BB962C8B-B14F-4D97-AF65-F5344CB8AC3E}">
-        <p14:creationId xmlns:p14="http://schemas.microsoft.com/office/powerpoint/2010/main" val="2794449880"/>
+        <p14:creationId xmlns:p14="http://schemas.microsoft.com/office/powerpoint/2010/main" val="3500650681"/>
       </p:ext>
     </p:extLst>
   </p:cSld>
   <p:clrMapOvr>
     <a:masterClrMapping/>
   </p:clrMapOvr>
-  <mc:AlternateContent xmlns:mc="http://schemas.openxmlformats.org/markup-compatibility/2006" xmlns:p14="http://schemas.microsoft.com/office/powerpoint/2010/main">
-    <mc:Choice Requires="p14">
+  <mc:AlternateContent xmlns:mc="http://schemas.openxmlformats.org/markup-compatibility/2006">
+    <mc:Choice xmlns:p14="http://schemas.microsoft.com/office/powerpoint/2010/main" Requires="p14">
       <p:transition spd="med" p14:dur="700">
         <p:fade/>
       </p:transition>
     </mc:Choice>
-    <mc:Fallback xmlns="">
+    <mc:Fallback>
       <p:transition spd="med">
         <p:fade/>
       </p:transition>
@@ -7828,7 +6624,7 @@
                 </a:effectLst>
                 <a:latin typeface="Baskerville Old Face" panose="02020602080505020303" pitchFamily="18" charset="0"/>
               </a:rPr>
-              <a:t>Q #3 – LN model – learning non rep - generator</a:t>
+              <a:t>Q #4 – STC eigenvalues –non-rep</a:t>
             </a:r>
             <a:endParaRPr lang="en-US" b="1" dirty="0">
               <a:solidFill>
@@ -7848,14 +6644,14 @@
       </p:sp>
       <p:pic>
         <p:nvPicPr>
-          <p:cNvPr id="3" name="תמונה 2"/>
+          <p:cNvPr id="4" name="תמונה 3"/>
           <p:cNvPicPr>
             <a:picLocks noChangeAspect="1"/>
           </p:cNvPicPr>
           <p:nvPr/>
         </p:nvPicPr>
         <p:blipFill>
-          <a:blip r:embed="rId3" cstate="print">
+          <a:blip r:embed="rId3">
             <a:extLst>
               <a:ext uri="{28A0092B-C50C-407E-A947-70E740481C1C}">
                 <a14:useLocalDpi xmlns:a14="http://schemas.microsoft.com/office/drawing/2010/main" val="0"/>
@@ -7868,8 +6664,8 @@
         </p:blipFill>
         <p:spPr>
           <a:xfrm>
-            <a:off x="1485900" y="980728"/>
-            <a:ext cx="9038740" cy="5084291"/>
+            <a:off x="2061964" y="980728"/>
+            <a:ext cx="7314595" cy="5485946"/>
           </a:xfrm>
           <a:prstGeom prst="rect">
             <a:avLst/>
@@ -7879,7 +6675,7 @@
     </p:spTree>
     <p:extLst>
       <p:ext uri="{BB962C8B-B14F-4D97-AF65-F5344CB8AC3E}">
-        <p14:creationId xmlns:p14="http://schemas.microsoft.com/office/powerpoint/2010/main" val="311383756"/>
+        <p14:creationId xmlns:p14="http://schemas.microsoft.com/office/powerpoint/2010/main" val="1931575417"/>
       </p:ext>
     </p:extLst>
   </p:cSld>

</xml_diff>